<commit_message>
update E2T2_securityhub, E4T3_securityhub, E2T2_config and E4T3_config screenshots, DevSecOpsPipline diagram
</commit_message>
<xml_diff>
--- a/Exercise-5/DevSecOpsPipline.pptx
+++ b/Exercise-5/DevSecOpsPipline.pptx
@@ -5832,7 +5832,7 @@
         <p:spPr>
           <a:xfrm flipV="1">
             <a:off x="3749363" y="3451037"/>
-            <a:ext cx="1527900" cy="927122"/>
+            <a:ext cx="1527900" cy="545942"/>
           </a:xfrm>
           <a:prstGeom prst="bentConnector2">
             <a:avLst/>
@@ -5924,8 +5924,8 @@
         </p:nvSpPr>
         <p:spPr>
           <a:xfrm>
-            <a:off x="2343955" y="1923134"/>
-            <a:ext cx="1308000" cy="597600"/>
+            <a:off x="1653871" y="1923134"/>
+            <a:ext cx="1998084" cy="597600"/>
           </a:xfrm>
           <a:prstGeom prst="rect">
             <a:avLst/>
@@ -5956,7 +5956,54 @@
               <a:rPr lang="en" sz="1000" dirty="0"/>
               <a:t>Scanning Application or OS Image</a:t>
             </a:r>
-            <a:endParaRPr sz="1000" dirty="0"/>
+          </a:p>
+          <a:p>
+            <a:pPr marL="0" lvl="0" indent="0" algn="ctr" rtl="0">
+              <a:spcBef>
+                <a:spcPts val="0"/>
+              </a:spcBef>
+              <a:spcAft>
+                <a:spcPts val="0"/>
+              </a:spcAft>
+              <a:buNone/>
+            </a:pPr>
+            <a:r>
+              <a:rPr lang="en" sz="1000" dirty="0">
+                <a:solidFill>
+                  <a:srgbClr val="FF0000"/>
+                </a:solidFill>
+              </a:rPr>
+              <a:t>Using tools: </a:t>
+            </a:r>
+            <a:r>
+              <a:rPr lang="en" sz="1000" dirty="0" err="1">
+                <a:solidFill>
+                  <a:srgbClr val="FF0000"/>
+                </a:solidFill>
+              </a:rPr>
+              <a:t>TerraScan</a:t>
+            </a:r>
+            <a:r>
+              <a:rPr lang="en" sz="1000" dirty="0">
+                <a:solidFill>
+                  <a:srgbClr val="FF0000"/>
+                </a:solidFill>
+              </a:rPr>
+              <a:t>, Regula, </a:t>
+            </a:r>
+            <a:r>
+              <a:rPr lang="en" sz="1000" dirty="0" err="1">
+                <a:solidFill>
+                  <a:srgbClr val="FF0000"/>
+                </a:solidFill>
+              </a:rPr>
+              <a:t>Checkov</a:t>
+            </a:r>
+            <a:endParaRPr sz="1000" dirty="0">
+              <a:solidFill>
+                <a:srgbClr val="FF0000"/>
+              </a:solidFill>
+            </a:endParaRPr>
           </a:p>
         </p:txBody>
       </p:sp>
@@ -5970,15 +6017,16 @@
             </a:extLst>
           </p:cNvPr>
           <p:cNvCxnSpPr>
+            <a:cxnSpLocks/>
             <a:stCxn id="54" idx="2"/>
             <a:endCxn id="5" idx="0"/>
           </p:cNvCxnSpPr>
           <p:nvPr/>
         </p:nvCxnSpPr>
         <p:spPr>
-          <a:xfrm>
-            <a:off x="2997955" y="1564038"/>
-            <a:ext cx="0" cy="359096"/>
+          <a:xfrm flipH="1">
+            <a:off x="2652913" y="1564038"/>
+            <a:ext cx="345042" cy="359096"/>
           </a:xfrm>
           <a:prstGeom prst="straightConnector1">
             <a:avLst/>
@@ -6016,8 +6064,8 @@
         </p:nvSpPr>
         <p:spPr>
           <a:xfrm>
-            <a:off x="2441363" y="4079359"/>
-            <a:ext cx="1308000" cy="597600"/>
+            <a:off x="2441363" y="3316998"/>
+            <a:ext cx="1308000" cy="1359961"/>
           </a:xfrm>
           <a:prstGeom prst="rect">
             <a:avLst/>
@@ -6048,7 +6096,38 @@
               <a:rPr lang="en" sz="1000" dirty="0"/>
               <a:t>Scanning Infrastructure code change</a:t>
             </a:r>
-            <a:endParaRPr sz="1000" dirty="0"/>
+          </a:p>
+          <a:p>
+            <a:pPr marL="0" lvl="0" indent="0" algn="ctr" rtl="0">
+              <a:spcBef>
+                <a:spcPts val="0"/>
+              </a:spcBef>
+              <a:spcAft>
+                <a:spcPts val="0"/>
+              </a:spcAft>
+              <a:buNone/>
+            </a:pPr>
+            <a:r>
+              <a:rPr lang="en" sz="1000" dirty="0">
+                <a:solidFill>
+                  <a:srgbClr val="FF0000"/>
+                </a:solidFill>
+              </a:rPr>
+              <a:t>Using tools: AWS Inspector, ECR Image Scanning, </a:t>
+            </a:r>
+            <a:r>
+              <a:rPr lang="en" sz="1000" dirty="0" err="1">
+                <a:solidFill>
+                  <a:srgbClr val="FF0000"/>
+                </a:solidFill>
+              </a:rPr>
+              <a:t>Trivy</a:t>
+            </a:r>
+            <a:endParaRPr sz="1000" dirty="0">
+              <a:solidFill>
+                <a:srgbClr val="FF0000"/>
+              </a:solidFill>
+            </a:endParaRPr>
           </a:p>
         </p:txBody>
       </p:sp>
@@ -6062,6 +6141,7 @@
             </a:extLst>
           </p:cNvPr>
           <p:cNvCxnSpPr>
+            <a:cxnSpLocks/>
             <a:stCxn id="58" idx="3"/>
             <a:endCxn id="15" idx="1"/>
           </p:cNvCxnSpPr>
@@ -6069,8 +6149,8 @@
         </p:nvCxnSpPr>
         <p:spPr>
           <a:xfrm flipV="1">
-            <a:off x="1526862" y="4378159"/>
-            <a:ext cx="914501" cy="6302"/>
+            <a:off x="1526862" y="3996979"/>
+            <a:ext cx="914501" cy="387482"/>
           </a:xfrm>
           <a:prstGeom prst="straightConnector1">
             <a:avLst/>
@@ -6109,7 +6189,7 @@
         <p:spPr>
           <a:xfrm>
             <a:off x="6984425" y="3316998"/>
-            <a:ext cx="1308000" cy="597600"/>
+            <a:ext cx="1897182" cy="936950"/>
           </a:xfrm>
           <a:prstGeom prst="rect">
             <a:avLst/>
@@ -6140,7 +6220,49 @@
               <a:rPr lang="en" sz="1000" dirty="0"/>
               <a:t>Post-Deployment Compliance Scan</a:t>
             </a:r>
-            <a:endParaRPr sz="1000" dirty="0"/>
+          </a:p>
+          <a:p>
+            <a:pPr marL="0" lvl="0" indent="0" algn="ctr" rtl="0">
+              <a:spcBef>
+                <a:spcPts val="0"/>
+              </a:spcBef>
+              <a:spcAft>
+                <a:spcPts val="0"/>
+              </a:spcAft>
+              <a:buNone/>
+            </a:pPr>
+            <a:r>
+              <a:rPr lang="en" sz="1000" dirty="0">
+                <a:solidFill>
+                  <a:srgbClr val="FF0000"/>
+                </a:solidFill>
+              </a:rPr>
+              <a:t>Using tools:</a:t>
+            </a:r>
+          </a:p>
+          <a:p>
+            <a:pPr marL="0" lvl="0" indent="0" algn="ctr" rtl="0">
+              <a:spcBef>
+                <a:spcPts val="0"/>
+              </a:spcBef>
+              <a:spcAft>
+                <a:spcPts val="0"/>
+              </a:spcAft>
+              <a:buNone/>
+            </a:pPr>
+            <a:r>
+              <a:rPr lang="en" sz="1000" dirty="0">
+                <a:solidFill>
+                  <a:srgbClr val="FF0000"/>
+                </a:solidFill>
+              </a:rPr>
+              <a:t>AWS Config, AWS Security Hub</a:t>
+            </a:r>
+            <a:endParaRPr sz="1000" dirty="0">
+              <a:solidFill>
+                <a:srgbClr val="FF0000"/>
+              </a:solidFill>
+            </a:endParaRPr>
           </a:p>
         </p:txBody>
       </p:sp>
@@ -6154,6 +6276,7 @@
             </a:extLst>
           </p:cNvPr>
           <p:cNvCxnSpPr>
+            <a:cxnSpLocks/>
             <a:stCxn id="55" idx="2"/>
             <a:endCxn id="28" idx="0"/>
           </p:cNvCxnSpPr>
@@ -6162,7 +6285,7 @@
         <p:spPr>
           <a:xfrm>
             <a:off x="7638425" y="2709025"/>
-            <a:ext cx="0" cy="607973"/>
+            <a:ext cx="294591" cy="607973"/>
           </a:xfrm>
           <a:prstGeom prst="straightConnector1">
             <a:avLst/>

</xml_diff>